<commit_message>
Modification to show the precision, recall, f1 score for all the models utilized to tuning is compelete here.
</commit_message>
<xml_diff>
--- a/Sales Analytics.pptx
+++ b/Sales Analytics.pptx
@@ -236,7 +236,7 @@
           <a:p>
             <a:fld id="{E7736193-EDE3-4BB5-AE5F-E6E5472AB8BE}" type="datetimeFigureOut">
               <a:rPr lang="en-US" smtClean="0"/>
-              <a:t>9/29/2023</a:t>
+              <a:t>10/9/2023</a:t>
             </a:fld>
             <a:endParaRPr lang="en-US"/>
           </a:p>
@@ -484,7 +484,7 @@
           <a:p>
             <a:fld id="{E7736193-EDE3-4BB5-AE5F-E6E5472AB8BE}" type="datetimeFigureOut">
               <a:rPr lang="en-US" smtClean="0"/>
-              <a:t>9/29/2023</a:t>
+              <a:t>10/9/2023</a:t>
             </a:fld>
             <a:endParaRPr lang="en-US"/>
           </a:p>
@@ -692,7 +692,7 @@
           <a:p>
             <a:fld id="{E7736193-EDE3-4BB5-AE5F-E6E5472AB8BE}" type="datetimeFigureOut">
               <a:rPr lang="en-US" smtClean="0"/>
-              <a:t>9/29/2023</a:t>
+              <a:t>10/9/2023</a:t>
             </a:fld>
             <a:endParaRPr lang="en-US"/>
           </a:p>
@@ -890,7 +890,7 @@
           <a:p>
             <a:fld id="{E7736193-EDE3-4BB5-AE5F-E6E5472AB8BE}" type="datetimeFigureOut">
               <a:rPr lang="en-US" smtClean="0"/>
-              <a:t>9/29/2023</a:t>
+              <a:t>10/9/2023</a:t>
             </a:fld>
             <a:endParaRPr lang="en-US"/>
           </a:p>
@@ -1167,7 +1167,7 @@
           <a:p>
             <a:fld id="{E7736193-EDE3-4BB5-AE5F-E6E5472AB8BE}" type="datetimeFigureOut">
               <a:rPr lang="en-US" smtClean="0"/>
-              <a:t>9/29/2023</a:t>
+              <a:t>10/9/2023</a:t>
             </a:fld>
             <a:endParaRPr lang="en-US"/>
           </a:p>
@@ -1437,7 +1437,7 @@
           <a:p>
             <a:fld id="{E7736193-EDE3-4BB5-AE5F-E6E5472AB8BE}" type="datetimeFigureOut">
               <a:rPr lang="en-US" smtClean="0"/>
-              <a:t>9/29/2023</a:t>
+              <a:t>10/9/2023</a:t>
             </a:fld>
             <a:endParaRPr lang="en-US"/>
           </a:p>
@@ -1853,7 +1853,7 @@
           <a:p>
             <a:fld id="{E7736193-EDE3-4BB5-AE5F-E6E5472AB8BE}" type="datetimeFigureOut">
               <a:rPr lang="en-US" smtClean="0"/>
-              <a:t>9/29/2023</a:t>
+              <a:t>10/9/2023</a:t>
             </a:fld>
             <a:endParaRPr lang="en-US"/>
           </a:p>
@@ -2086,7 +2086,7 @@
           <a:p>
             <a:fld id="{E7736193-EDE3-4BB5-AE5F-E6E5472AB8BE}" type="datetimeFigureOut">
               <a:rPr lang="en-US" smtClean="0"/>
-              <a:t>9/29/2023</a:t>
+              <a:t>10/9/2023</a:t>
             </a:fld>
             <a:endParaRPr lang="en-US"/>
           </a:p>
@@ -2199,7 +2199,7 @@
           <a:p>
             <a:fld id="{E7736193-EDE3-4BB5-AE5F-E6E5472AB8BE}" type="datetimeFigureOut">
               <a:rPr lang="en-US" smtClean="0"/>
-              <a:t>9/29/2023</a:t>
+              <a:t>10/9/2023</a:t>
             </a:fld>
             <a:endParaRPr lang="en-US"/>
           </a:p>
@@ -2516,7 +2516,7 @@
           <a:p>
             <a:fld id="{E7736193-EDE3-4BB5-AE5F-E6E5472AB8BE}" type="datetimeFigureOut">
               <a:rPr lang="en-US" smtClean="0"/>
-              <a:t>9/29/2023</a:t>
+              <a:t>10/9/2023</a:t>
             </a:fld>
             <a:endParaRPr lang="en-US"/>
           </a:p>
@@ -2869,7 +2869,7 @@
           <a:p>
             <a:fld id="{E7736193-EDE3-4BB5-AE5F-E6E5472AB8BE}" type="datetimeFigureOut">
               <a:rPr lang="en-US" smtClean="0"/>
-              <a:t>9/29/2023</a:t>
+              <a:t>10/9/2023</a:t>
             </a:fld>
             <a:endParaRPr lang="en-US"/>
           </a:p>
@@ -3167,7 +3167,7 @@
           <a:p>
             <a:fld id="{E7736193-EDE3-4BB5-AE5F-E6E5472AB8BE}" type="datetimeFigureOut">
               <a:rPr lang="en-US" smtClean="0"/>
-              <a:t>9/29/2023</a:t>
+              <a:t>10/9/2023</a:t>
             </a:fld>
             <a:endParaRPr lang="en-US"/>
           </a:p>
@@ -3691,7 +3691,7 @@
         <p:spPr>
           <a:xfrm>
             <a:off x="729620" y="1597224"/>
-            <a:ext cx="3939362" cy="1841435"/>
+            <a:ext cx="5142860" cy="1841435"/>
           </a:xfrm>
         </p:spPr>
         <p:txBody>
@@ -3702,7 +3702,7 @@
           <a:p>
             <a:r>
               <a:rPr lang="en-IN" dirty="0"/>
-              <a:t>ELGI Sales Analytics</a:t>
+              <a:t> SAles Analytics</a:t>
             </a:r>
           </a:p>
         </p:txBody>
@@ -3788,7 +3788,7 @@
                   <a:spcPts val="600"/>
                 </a:spcAft>
               </a:pPr>
-              <a:t>9/29/2023</a:t>
+              <a:t>10/9/2023</a:t>
             </a:fld>
             <a:endParaRPr lang="en-US" dirty="0">
               <a:effectLst>
@@ -4676,10 +4676,10 @@
       </p:sp>
       <p:pic>
         <p:nvPicPr>
-          <p:cNvPr id="4" name="Picture 3">
-            <a:extLst>
-              <a:ext uri="{FF2B5EF4-FFF2-40B4-BE49-F238E27FC236}">
-                <a16:creationId xmlns:a16="http://schemas.microsoft.com/office/drawing/2014/main" id="{C1BD8E56-E164-BAD5-9DD6-70D99FA31EC8}"/>
+          <p:cNvPr id="5" name="Picture 4" descr="A group of yellow bars&#10;&#10;Description automatically generated with medium confidence">
+            <a:extLst>
+              <a:ext uri="{FF2B5EF4-FFF2-40B4-BE49-F238E27FC236}">
+                <a16:creationId xmlns:a16="http://schemas.microsoft.com/office/drawing/2014/main" id="{F79F1A98-AFF4-1D73-1BDA-4AA89CEF947F}"/>
               </a:ext>
             </a:extLst>
           </p:cNvPr>
@@ -4702,7 +4702,7 @@
         </p:blipFill>
         <p:spPr>
           <a:xfrm>
-            <a:off x="103704" y="1033135"/>
+            <a:off x="103704" y="1132119"/>
             <a:ext cx="7153940" cy="5365455"/>
           </a:xfrm>
           <a:prstGeom prst="rect">
@@ -5139,8 +5139,8 @@
         </p:nvSpPr>
         <p:spPr>
           <a:xfrm>
-            <a:off x="7282927" y="2682240"/>
-            <a:ext cx="4458153" cy="3809999"/>
+            <a:off x="9377680" y="1225865"/>
+            <a:ext cx="2363400" cy="5266374"/>
           </a:xfrm>
           <a:prstGeom prst="roundRect">
             <a:avLst/>
@@ -5177,8 +5177,100 @@
                 <a:latin typeface="Poppins" panose="00000500000000000000" pitchFamily="2" charset="0"/>
                 <a:cs typeface="Poppins" panose="00000500000000000000" pitchFamily="2" charset="0"/>
               </a:rPr>
-              <a:t>Precision – Customer type 1 and 2 where predicted well while customer type 3&amp;4 had false positives</a:t>
-            </a:r>
+              <a:t>Precision</a:t>
+            </a:r>
+            <a:r>
+              <a:rPr lang="en-US" sz="1000" dirty="0">
+                <a:latin typeface="Poppins" panose="00000500000000000000" pitchFamily="2" charset="0"/>
+                <a:cs typeface="Poppins" panose="00000500000000000000" pitchFamily="2" charset="0"/>
+              </a:rPr>
+              <a:t> – </a:t>
+            </a:r>
+            <a:r>
+              <a:rPr lang="en-US" sz="1000" b="0" i="0" dirty="0">
+                <a:solidFill>
+                  <a:srgbClr val="D1D5DB"/>
+                </a:solidFill>
+                <a:effectLst/>
+                <a:latin typeface="Poppins" panose="00000500000000000000" pitchFamily="2" charset="0"/>
+                <a:cs typeface="Poppins" panose="00000500000000000000" pitchFamily="2" charset="0"/>
+              </a:rPr>
+              <a:t>measures the accuracy of positive predictions made by a model. Higher precision indicates fewer false positives and a lower rate of incorrectly classifying negative samples as positive.</a:t>
+            </a:r>
+          </a:p>
+          <a:p>
+            <a:endParaRPr lang="en-US" sz="1000" dirty="0">
+              <a:latin typeface="Poppins" panose="00000500000000000000" pitchFamily="2" charset="0"/>
+              <a:cs typeface="Poppins" panose="00000500000000000000" pitchFamily="2" charset="0"/>
+            </a:endParaRPr>
+          </a:p>
+          <a:p>
+            <a:r>
+              <a:rPr lang="en-US" sz="1200" dirty="0">
+                <a:latin typeface="Poppins" panose="00000500000000000000" pitchFamily="2" charset="0"/>
+                <a:cs typeface="Poppins" panose="00000500000000000000" pitchFamily="2" charset="0"/>
+              </a:rPr>
+              <a:t>Recall</a:t>
+            </a:r>
+            <a:r>
+              <a:rPr lang="en-US" sz="1000" dirty="0">
+                <a:latin typeface="Poppins" panose="00000500000000000000" pitchFamily="2" charset="0"/>
+                <a:cs typeface="Poppins" panose="00000500000000000000" pitchFamily="2" charset="0"/>
+              </a:rPr>
+              <a:t> – </a:t>
+            </a:r>
+            <a:r>
+              <a:rPr lang="en-US" sz="1000" b="0" i="0" dirty="0">
+                <a:solidFill>
+                  <a:srgbClr val="D1D5DB"/>
+                </a:solidFill>
+                <a:effectLst/>
+                <a:latin typeface="Poppins" panose="00000500000000000000" pitchFamily="2" charset="0"/>
+                <a:cs typeface="Poppins" panose="00000500000000000000" pitchFamily="2" charset="0"/>
+              </a:rPr>
+              <a:t>measures a model's ability to identify all positive instances in a dataset correctly. Higher recall indicates a lower rate of missing positive samples.</a:t>
+            </a:r>
+            <a:endParaRPr lang="en-US" sz="1000" dirty="0">
+              <a:latin typeface="Poppins" panose="00000500000000000000" pitchFamily="2" charset="0"/>
+              <a:cs typeface="Poppins" panose="00000500000000000000" pitchFamily="2" charset="0"/>
+            </a:endParaRPr>
+          </a:p>
+          <a:p>
+            <a:endParaRPr lang="en-US" sz="1000" dirty="0">
+              <a:latin typeface="Poppins" panose="00000500000000000000" pitchFamily="2" charset="0"/>
+              <a:cs typeface="Poppins" panose="00000500000000000000" pitchFamily="2" charset="0"/>
+            </a:endParaRPr>
+          </a:p>
+          <a:p>
+            <a:r>
+              <a:rPr lang="en-US" sz="1200" dirty="0">
+                <a:latin typeface="Poppins" panose="00000500000000000000" pitchFamily="2" charset="0"/>
+                <a:cs typeface="Poppins" panose="00000500000000000000" pitchFamily="2" charset="0"/>
+              </a:rPr>
+              <a:t>F1 – score </a:t>
+            </a:r>
+            <a:r>
+              <a:rPr lang="en-US" sz="1000" dirty="0">
+                <a:latin typeface="Poppins" panose="00000500000000000000" pitchFamily="2" charset="0"/>
+                <a:cs typeface="Poppins" panose="00000500000000000000" pitchFamily="2" charset="0"/>
+              </a:rPr>
+              <a:t>– </a:t>
+            </a:r>
+            <a:r>
+              <a:rPr lang="en-US" sz="1000" b="0" i="0" dirty="0">
+                <a:solidFill>
+                  <a:srgbClr val="D1D5DB"/>
+                </a:solidFill>
+                <a:effectLst/>
+                <a:latin typeface="Poppins" panose="00000500000000000000" pitchFamily="2" charset="0"/>
+                <a:cs typeface="Poppins" panose="00000500000000000000" pitchFamily="2" charset="0"/>
+              </a:rPr>
+              <a:t>The F1 score is a harmonic mean of precision and recall, offering a balance between these two metrics. A higher F1 score indicates a better trade-off between precision and recall.</a:t>
+            </a:r>
+            <a:endParaRPr lang="en-US" sz="1000" dirty="0">
+              <a:latin typeface="Poppins" panose="00000500000000000000" pitchFamily="2" charset="0"/>
+              <a:cs typeface="Poppins" panose="00000500000000000000" pitchFamily="2" charset="0"/>
+            </a:endParaRPr>
           </a:p>
           <a:p>
             <a:endParaRPr lang="en-US" sz="1200" dirty="0">
@@ -5192,53 +5284,17 @@
                 <a:latin typeface="Poppins" panose="00000500000000000000" pitchFamily="2" charset="0"/>
                 <a:cs typeface="Poppins" panose="00000500000000000000" pitchFamily="2" charset="0"/>
               </a:rPr>
-              <a:t>Recall – This is about relevant predictions, where class 2 has small portion of relevant predictions, 1 &amp; 3 where good, 4 is decently good</a:t>
-            </a:r>
-          </a:p>
-          <a:p>
-            <a:endParaRPr lang="en-US" sz="1200" dirty="0">
-              <a:latin typeface="Poppins" panose="00000500000000000000" pitchFamily="2" charset="0"/>
-              <a:cs typeface="Poppins" panose="00000500000000000000" pitchFamily="2" charset="0"/>
-            </a:endParaRPr>
-          </a:p>
-          <a:p>
-            <a:r>
-              <a:rPr lang="en-US" sz="1200" dirty="0">
-                <a:latin typeface="Poppins" panose="00000500000000000000" pitchFamily="2" charset="0"/>
-                <a:cs typeface="Poppins" panose="00000500000000000000" pitchFamily="2" charset="0"/>
-              </a:rPr>
-              <a:t>F1 – score – its about harmonic mean of precision &amp; recall where 1 is high accuracy, 2 is lower, 3 is decent, 4 is good.</a:t>
-            </a:r>
-          </a:p>
-          <a:p>
-            <a:endParaRPr lang="en-US" sz="1200" dirty="0">
-              <a:latin typeface="Poppins" panose="00000500000000000000" pitchFamily="2" charset="0"/>
-              <a:cs typeface="Poppins" panose="00000500000000000000" pitchFamily="2" charset="0"/>
-            </a:endParaRPr>
-          </a:p>
-          <a:p>
-            <a:r>
-              <a:rPr lang="en-US" sz="1200" dirty="0">
-                <a:latin typeface="Poppins" panose="00000500000000000000" pitchFamily="2" charset="0"/>
-                <a:cs typeface="Poppins" panose="00000500000000000000" pitchFamily="2" charset="0"/>
-              </a:rPr>
-              <a:t>Over all model accuracy is 62.67%</a:t>
-            </a:r>
-          </a:p>
-          <a:p>
-            <a:endParaRPr lang="en-IN" sz="1200" dirty="0">
-              <a:latin typeface="Poppins" panose="00000500000000000000" pitchFamily="2" charset="0"/>
-              <a:cs typeface="Poppins" panose="00000500000000000000" pitchFamily="2" charset="0"/>
-            </a:endParaRPr>
+              <a:t>Overall model accuracy is 89.8%</a:t>
+            </a:r>
           </a:p>
         </p:txBody>
       </p:sp>
       <p:pic>
         <p:nvPicPr>
-          <p:cNvPr id="4" name="Picture 3">
-            <a:extLst>
-              <a:ext uri="{FF2B5EF4-FFF2-40B4-BE49-F238E27FC236}">
-                <a16:creationId xmlns:a16="http://schemas.microsoft.com/office/drawing/2014/main" id="{6D3A5DDE-CC21-7FD0-81CE-F24A6838962C}"/>
+          <p:cNvPr id="2" name="Picture 1" descr="A group of yellow bars&#10;&#10;Description automatically generated with medium confidence">
+            <a:extLst>
+              <a:ext uri="{FF2B5EF4-FFF2-40B4-BE49-F238E27FC236}">
+                <a16:creationId xmlns:a16="http://schemas.microsoft.com/office/drawing/2014/main" id="{B7B14189-F659-4C41-342F-BCD87150DE72}"/>
               </a:ext>
             </a:extLst>
           </p:cNvPr>
@@ -5248,41 +5304,33 @@
           <p:nvPr/>
         </p:nvPicPr>
         <p:blipFill>
-          <a:blip r:embed="rId2"/>
+          <a:blip r:embed="rId2">
+            <a:extLst>
+              <a:ext uri="{28A0092B-C50C-407E-A947-70E740481C1C}">
+                <a14:useLocalDpi xmlns:a14="http://schemas.microsoft.com/office/drawing/2010/main" val="0"/>
+              </a:ext>
+            </a:extLst>
+          </a:blip>
           <a:stretch>
             <a:fillRect/>
           </a:stretch>
         </p:blipFill>
         <p:spPr>
           <a:xfrm>
-            <a:off x="7461927" y="136906"/>
-            <a:ext cx="4279153" cy="2232234"/>
+            <a:off x="-2301" y="648585"/>
+            <a:ext cx="5880536" cy="4410402"/>
           </a:xfrm>
           <a:prstGeom prst="rect">
             <a:avLst/>
           </a:prstGeom>
-          <a:ln w="38100" cap="sq">
-            <a:solidFill>
-              <a:srgbClr val="000000"/>
-            </a:solidFill>
-            <a:prstDash val="solid"/>
-            <a:miter lim="800000"/>
-          </a:ln>
-          <a:effectLst>
-            <a:outerShdw blurRad="50800" dist="38100" dir="2700000" algn="tl" rotWithShape="0">
-              <a:srgbClr val="000000">
-                <a:alpha val="43000"/>
-              </a:srgbClr>
-            </a:outerShdw>
-          </a:effectLst>
         </p:spPr>
       </p:pic>
       <p:pic>
         <p:nvPicPr>
-          <p:cNvPr id="6" name="Picture 5">
-            <a:extLst>
-              <a:ext uri="{FF2B5EF4-FFF2-40B4-BE49-F238E27FC236}">
-                <a16:creationId xmlns:a16="http://schemas.microsoft.com/office/drawing/2014/main" id="{A8BAF7C7-4A56-93B4-0924-F19CDE410D22}"/>
+          <p:cNvPr id="5" name="Picture 4">
+            <a:extLst>
+              <a:ext uri="{FF2B5EF4-FFF2-40B4-BE49-F238E27FC236}">
+                <a16:creationId xmlns:a16="http://schemas.microsoft.com/office/drawing/2014/main" id="{2A36BC13-FEAF-C0E8-A08D-4EBF9E022F98}"/>
               </a:ext>
             </a:extLst>
           </p:cNvPr>
@@ -5292,27 +5340,135 @@
           <p:nvPr/>
         </p:nvPicPr>
         <p:blipFill>
-          <a:blip r:embed="rId3">
-            <a:extLst>
-              <a:ext uri="{28A0092B-C50C-407E-A947-70E740481C1C}">
-                <a14:useLocalDpi xmlns:a14="http://schemas.microsoft.com/office/drawing/2010/main" val="0"/>
-              </a:ext>
-            </a:extLst>
-          </a:blip>
+          <a:blip r:embed="rId3"/>
           <a:stretch>
             <a:fillRect/>
           </a:stretch>
         </p:blipFill>
         <p:spPr>
           <a:xfrm>
-            <a:off x="103704" y="1033136"/>
-            <a:ext cx="6825416" cy="5119062"/>
+            <a:off x="5950565" y="648585"/>
+            <a:ext cx="2512715" cy="4309557"/>
           </a:xfrm>
           <a:prstGeom prst="rect">
             <a:avLst/>
           </a:prstGeom>
         </p:spPr>
       </p:pic>
+      <p:pic>
+        <p:nvPicPr>
+          <p:cNvPr id="10" name="Picture 9">
+            <a:extLst>
+              <a:ext uri="{FF2B5EF4-FFF2-40B4-BE49-F238E27FC236}">
+                <a16:creationId xmlns:a16="http://schemas.microsoft.com/office/drawing/2014/main" id="{37D445BA-ACA3-E500-840E-41784E5A025A}"/>
+              </a:ext>
+            </a:extLst>
+          </p:cNvPr>
+          <p:cNvPicPr>
+            <a:picLocks noChangeAspect="1"/>
+          </p:cNvPicPr>
+          <p:nvPr/>
+        </p:nvPicPr>
+        <p:blipFill rotWithShape="1">
+          <a:blip r:embed="rId4"/>
+          <a:srcRect t="48795"/>
+          <a:stretch/>
+        </p:blipFill>
+        <p:spPr>
+          <a:xfrm>
+            <a:off x="5950565" y="4931275"/>
+            <a:ext cx="2512715" cy="1077091"/>
+          </a:xfrm>
+          <a:prstGeom prst="rect">
+            <a:avLst/>
+          </a:prstGeom>
+        </p:spPr>
+      </p:pic>
+      <p:pic>
+        <p:nvPicPr>
+          <p:cNvPr id="11" name="Picture 10">
+            <a:extLst>
+              <a:ext uri="{FF2B5EF4-FFF2-40B4-BE49-F238E27FC236}">
+                <a16:creationId xmlns:a16="http://schemas.microsoft.com/office/drawing/2014/main" id="{271B35B3-3AFB-982F-15FF-9429F01F028B}"/>
+              </a:ext>
+            </a:extLst>
+          </p:cNvPr>
+          <p:cNvPicPr>
+            <a:picLocks noChangeAspect="1"/>
+          </p:cNvPicPr>
+          <p:nvPr/>
+        </p:nvPicPr>
+        <p:blipFill rotWithShape="1">
+          <a:blip r:embed="rId4"/>
+          <a:srcRect b="54867"/>
+          <a:stretch/>
+        </p:blipFill>
+        <p:spPr>
+          <a:xfrm>
+            <a:off x="3365520" y="5058987"/>
+            <a:ext cx="2512715" cy="949379"/>
+          </a:xfrm>
+          <a:prstGeom prst="rect">
+            <a:avLst/>
+          </a:prstGeom>
+        </p:spPr>
+      </p:pic>
+      <p:sp>
+        <p:nvSpPr>
+          <p:cNvPr id="12" name="Rectangle 11">
+            <a:extLst>
+              <a:ext uri="{FF2B5EF4-FFF2-40B4-BE49-F238E27FC236}">
+                <a16:creationId xmlns:a16="http://schemas.microsoft.com/office/drawing/2014/main" id="{6055AA78-2739-279C-DFF5-DC1C4303A4DB}"/>
+              </a:ext>
+            </a:extLst>
+          </p:cNvPr>
+          <p:cNvSpPr/>
+          <p:nvPr/>
+        </p:nvSpPr>
+        <p:spPr>
+          <a:xfrm>
+            <a:off x="3219767" y="4991607"/>
+            <a:ext cx="2658467" cy="1217807"/>
+          </a:xfrm>
+          <a:prstGeom prst="rect">
+            <a:avLst/>
+          </a:prstGeom>
+          <a:solidFill>
+            <a:srgbClr val="92D050">
+              <a:alpha val="30196"/>
+            </a:srgbClr>
+          </a:solidFill>
+          <a:ln w="38100">
+            <a:solidFill>
+              <a:srgbClr val="92D050"/>
+            </a:solidFill>
+          </a:ln>
+        </p:spPr>
+        <p:style>
+          <a:lnRef idx="2">
+            <a:schemeClr val="accent1">
+              <a:shade val="15000"/>
+            </a:schemeClr>
+          </a:lnRef>
+          <a:fillRef idx="1">
+            <a:schemeClr val="accent1"/>
+          </a:fillRef>
+          <a:effectRef idx="0">
+            <a:schemeClr val="accent1"/>
+          </a:effectRef>
+          <a:fontRef idx="minor">
+            <a:schemeClr val="lt1"/>
+          </a:fontRef>
+        </p:style>
+        <p:txBody>
+          <a:bodyPr rtlCol="0" anchor="ctr"/>
+          <a:lstStyle/>
+          <a:p>
+            <a:pPr algn="ctr"/>
+            <a:endParaRPr lang="en-IN"/>
+          </a:p>
+        </p:txBody>
+      </p:sp>
     </p:spTree>
     <p:extLst>
       <p:ext uri="{BB962C8B-B14F-4D97-AF65-F5344CB8AC3E}">
@@ -6198,7 +6354,7 @@
                 <a:ea typeface="Calibri Light" panose="020F0302020204030204" pitchFamily="34" charset="0"/>
                 <a:cs typeface="Poppins" panose="00000500000000000000" pitchFamily="2" charset="0"/>
               </a:rPr>
-              <a:t>As per the observation made on the ELGI Annual report for 2021 -22 and 2022-23, the following were some data points to be noted,</a:t>
+              <a:t>As per the observation made on the Company Annual report for 2021 -22 and 2022-23, the following were some data points to be noted,</a:t>
             </a:r>
           </a:p>
           <a:p>
@@ -6460,7 +6616,23 @@
                 <a:ea typeface="Calibri Light" panose="020F0302020204030204" pitchFamily="34" charset="0"/>
                 <a:cs typeface="Poppins" panose="00000500000000000000" pitchFamily="2" charset="0"/>
               </a:rPr>
-              <a:t>Note: We tried to synthesize the 2021 and 2022 data considering various parameters such as Product categories, customer ID, region, units, cost_per_unit, sales_cost, staff_qty, per staff cost, and staff cost. These data points are used here to make a data storyboard in the forthcoming slides.</a:t>
+              <a:t>Note: We tried to synthesize the 2021 and 2022 data considering various parameters such as Product categories, customer ID, region, units, cost_per_unit, </a:t>
+            </a:r>
+            <a:r>
+              <a:rPr lang="en-IN" sz="1200" dirty="0" err="1">
+                <a:latin typeface="Poppins" panose="00000500000000000000" pitchFamily="2" charset="0"/>
+                <a:ea typeface="Calibri Light" panose="020F0302020204030204" pitchFamily="34" charset="0"/>
+                <a:cs typeface="Poppins" panose="00000500000000000000" pitchFamily="2" charset="0"/>
+              </a:rPr>
+              <a:t>sales_cost</a:t>
+            </a:r>
+            <a:r>
+              <a:rPr lang="en-IN" sz="1200" dirty="0">
+                <a:latin typeface="Poppins" panose="00000500000000000000" pitchFamily="2" charset="0"/>
+                <a:ea typeface="Calibri Light" panose="020F0302020204030204" pitchFamily="34" charset="0"/>
+                <a:cs typeface="Poppins" panose="00000500000000000000" pitchFamily="2" charset="0"/>
+              </a:rPr>
+              <a:t>, staff_qty, per staff cost, and staff cost. These data points are used here to make a data storyboard in the forthcoming slides.</a:t>
             </a:r>
           </a:p>
         </p:txBody>
@@ -7150,9 +7322,10 @@
           <a:p>
             <a:pPr algn="ctr"/>
             <a:r>
-              <a:rPr lang="en-IN" dirty="0"/>
+              <a:rPr lang="en-IN" dirty="0" err="1"/>
               <a:t>Sales_cost</a:t>
             </a:r>
+            <a:endParaRPr lang="en-IN" dirty="0"/>
           </a:p>
         </p:txBody>
       </p:sp>

</xml_diff>